<commit_message>
Demo script and presentation tweaks
</commit_message>
<xml_diff>
--- a/BBCMicro.pptx
+++ b/BBCMicro.pptx
@@ -10691,10 +10691,10 @@
         </p:nvGrpSpPr>
         <p:grpSpPr>
           <a:xfrm>
-            <a:off x="9019290" y="3607275"/>
-            <a:ext cx="2851082" cy="2776696"/>
+            <a:off x="9045380" y="3396051"/>
+            <a:ext cx="2851082" cy="3053695"/>
             <a:chOff x="8929151" y="3623084"/>
-            <a:chExt cx="2851082" cy="2776696"/>
+            <a:chExt cx="2851082" cy="3053695"/>
           </a:xfrm>
         </p:grpSpPr>
         <p:sp>
@@ -10712,7 +10712,7 @@
           <p:spPr>
             <a:xfrm>
               <a:off x="8949271" y="4091456"/>
-              <a:ext cx="2830962" cy="2308324"/>
+              <a:ext cx="2830962" cy="2585323"/>
             </a:xfrm>
             <a:prstGeom prst="rect">
               <a:avLst/>
@@ -10802,6 +10802,19 @@
                   <a:cs typeface="Courier New" panose="02070309020205020404" pitchFamily="49" charset="0"/>
                 </a:rPr>
                 <a:t>Memory inspection</a:t>
+              </a:r>
+            </a:p>
+            <a:p>
+              <a:pPr marL="285750" indent="-285750">
+                <a:buFont typeface="Wingdings" panose="05000000000000000000" pitchFamily="2" charset="2"/>
+                <a:buChar char="§"/>
+              </a:pPr>
+              <a:r>
+                <a:rPr lang="en-GB" dirty="0">
+                  <a:latin typeface="Courier New" panose="02070309020205020404" pitchFamily="49" charset="0"/>
+                  <a:cs typeface="Courier New" panose="02070309020205020404" pitchFamily="49" charset="0"/>
+                </a:rPr>
+                <a:t>Set reg/mem</a:t>
               </a:r>
             </a:p>
             <a:p>

</xml_diff>